<commit_message>
Update SWOT Matrix to 2 slides
</commit_message>
<xml_diff>
--- a/generated_docs/SWOT_Matrix.pptx
+++ b/generated_docs/SWOT_Matrix.pptx
@@ -6,6 +6,7 @@
   </p:sldMasterIdLst>
   <p:sldIdLst>
     <p:sldId id="256" r:id="rId7"/>
+    <p:sldId id="257" r:id="rId8"/>
   </p:sldIdLst>
   <p:sldSz cx="12191695" cy="6858000" type="screen4x3"/>
   <p:notesSz cx="6858000" cy="9144000"/>
@@ -3117,7 +3118,7 @@
                   <a:srgbClr val="003057"/>
                 </a:solidFill>
               </a:rPr>
-              <a:t>SWOT Analysis</a:t>
+              <a:t>SWOT Analysis — Internal Factors</a:t>
             </a:r>
           </a:p>
           <a:p>
@@ -3178,7 +3179,7 @@
         <p:spPr>
           <a:xfrm>
             <a:off x="365760" y="1399031"/>
-            <a:ext cx="5577840" cy="2350008"/>
+            <a:ext cx="5577840" cy="5093208"/>
           </a:xfrm>
           <a:prstGeom prst="rect">
             <a:avLst/>
@@ -3622,7 +3623,7 @@
         <p:spPr>
           <a:xfrm>
             <a:off x="6309360" y="1399031"/>
-            <a:ext cx="5577840" cy="2350008"/>
+            <a:ext cx="5577840" cy="5093208"/>
           </a:xfrm>
           <a:prstGeom prst="rect">
             <a:avLst/>
@@ -3967,15 +3968,78 @@
           </a:p>
         </p:txBody>
       </p:sp>
-      <p:sp>
-        <p:nvSpPr>
-          <p:cNvPr id="7" name="TextBox 6"/>
+    </p:spTree>
+  </p:cSld>
+  <p:clrMapOvr>
+    <a:masterClrMapping/>
+  </p:clrMapOvr>
+</p:sld>
+</file>
+
+<file path=ppt/slides/slide2.xml><?xml version="1.0" encoding="utf-8"?>
+<p:sld xmlns:a="http://schemas.openxmlformats.org/drawingml/2006/main" xmlns:p="http://schemas.openxmlformats.org/presentationml/2006/main" xmlns:r="http://schemas.openxmlformats.org/officeDocument/2006/relationships">
+  <p:cSld>
+    <p:spTree>
+      <p:nvGrpSpPr>
+        <p:cNvPr id="1" name=""/>
+        <p:cNvGrpSpPr/>
+        <p:nvPr/>
+      </p:nvGrpSpPr>
+      <p:grpSpPr/>
+      <p:sp>
+        <p:nvSpPr>
+          <p:cNvPr id="2" name="TextBox 1"/>
           <p:cNvSpPr txBox="1"/>
           <p:nvPr/>
         </p:nvSpPr>
         <p:spPr>
           <a:xfrm>
-            <a:off x="365760" y="3931920"/>
+            <a:off x="365760" y="228600"/>
+            <a:ext cx="11430000" cy="548640"/>
+          </a:xfrm>
+          <a:prstGeom prst="rect">
+            <a:avLst/>
+          </a:prstGeom>
+          <a:noFill/>
+        </p:spPr>
+        <p:txBody>
+          <a:bodyPr wrap="square">
+            <a:spAutoFit/>
+          </a:bodyPr>
+          <a:lstStyle/>
+          <a:p>
+            <a:pPr algn="l"/>
+            <a:r>
+              <a:rPr sz="2800" b="1">
+                <a:solidFill>
+                  <a:srgbClr val="003057"/>
+                </a:solidFill>
+              </a:rPr>
+              <a:t>SWOT Analysis — External Factors</a:t>
+            </a:r>
+          </a:p>
+          <a:p>
+            <a:pPr algn="l"/>
+            <a:r>
+              <a:rPr sz="1100">
+                <a:solidFill>
+                  <a:srgbClr val="666666"/>
+                </a:solidFill>
+              </a:rPr>
+              <a:t>Fort Lewis College | Durango, Colorado | Cross-Framework Strategic Synthesis</a:t>
+            </a:r>
+          </a:p>
+        </p:txBody>
+      </p:sp>
+      <p:sp>
+        <p:nvSpPr>
+          <p:cNvPr id="3" name="TextBox 2"/>
+          <p:cNvSpPr txBox="1"/>
+          <p:nvPr/>
+        </p:nvSpPr>
+        <p:spPr>
+          <a:xfrm>
+            <a:off x="365760" y="1051560"/>
             <a:ext cx="5577840" cy="347472"/>
           </a:xfrm>
           <a:prstGeom prst="rect">
@@ -4005,14 +4069,14 @@
       </p:sp>
       <p:sp>
         <p:nvSpPr>
-          <p:cNvPr id="8" name="TextBox 7"/>
+          <p:cNvPr id="4" name="TextBox 3"/>
           <p:cNvSpPr txBox="1"/>
           <p:nvPr/>
         </p:nvSpPr>
         <p:spPr>
           <a:xfrm>
-            <a:off x="365760" y="4279392"/>
-            <a:ext cx="5577840" cy="2350008"/>
+            <a:off x="365760" y="1399031"/>
+            <a:ext cx="5577840" cy="5093208"/>
           </a:xfrm>
           <a:prstGeom prst="rect">
             <a:avLst/>
@@ -4359,13 +4423,13 @@
       </p:sp>
       <p:sp>
         <p:nvSpPr>
-          <p:cNvPr id="9" name="TextBox 8"/>
+          <p:cNvPr id="5" name="TextBox 4"/>
           <p:cNvSpPr txBox="1"/>
           <p:nvPr/>
         </p:nvSpPr>
         <p:spPr>
           <a:xfrm>
-            <a:off x="6309360" y="3931920"/>
+            <a:off x="6309360" y="1051560"/>
             <a:ext cx="5577840" cy="347472"/>
           </a:xfrm>
           <a:prstGeom prst="rect">
@@ -4395,14 +4459,14 @@
       </p:sp>
       <p:sp>
         <p:nvSpPr>
-          <p:cNvPr id="10" name="TextBox 9"/>
+          <p:cNvPr id="6" name="TextBox 5"/>
           <p:cNvSpPr txBox="1"/>
           <p:nvPr/>
         </p:nvSpPr>
         <p:spPr>
           <a:xfrm>
-            <a:off x="6309360" y="4279392"/>
-            <a:ext cx="5577840" cy="2350008"/>
+            <a:off x="6309360" y="1399031"/>
+            <a:ext cx="5577840" cy="5093208"/>
           </a:xfrm>
           <a:prstGeom prst="rect">
             <a:avLst/>

</xml_diff>